<commit_message>
Corrections after week10 class
</commit_message>
<xml_diff>
--- a/week10/pictures/source.pptx
+++ b/week10/pictures/source.pptx
@@ -104,6 +104,11 @@
       </a:defRPr>
     </a:lvl9pPr>
   </p:defaultTextStyle>
+  <p:extLst>
+    <p:ext uri="{EFAFB233-063F-42B5-8137-9DF3F51BA10A}">
+      <p15:sldGuideLst xmlns:p15="http://schemas.microsoft.com/office/powerpoint/2012/main"/>
+    </p:ext>
+  </p:extLst>
 </p:presentation>
 </file>
 
@@ -149,10 +154,9 @@
           </a:lstStyle>
           <a:p>
             <a:r>
-              <a:rPr lang="en-US" smtClean="0"/>
+              <a:rPr lang="en-US"/>
               <a:t>Click to edit Master title style</a:t>
             </a:r>
-            <a:endParaRPr lang="en-US"/>
           </a:p>
         </p:txBody>
       </p:sp>
@@ -214,10 +218,9 @@
           </a:lstStyle>
           <a:p>
             <a:r>
-              <a:rPr lang="en-US" smtClean="0"/>
+              <a:rPr lang="en-US"/>
               <a:t>Click to edit Master subtitle style</a:t>
             </a:r>
-            <a:endParaRPr lang="en-US"/>
           </a:p>
         </p:txBody>
       </p:sp>
@@ -238,7 +241,7 @@
           <a:p>
             <a:fld id="{7FF674A5-C7DF-5E4D-B3C6-AAC72EBAE934}" type="datetimeFigureOut">
               <a:rPr lang="en-US" smtClean="0"/>
-              <a:t>4/27/17</a:t>
+              <a:t>4/30/18</a:t>
             </a:fld>
             <a:endParaRPr lang="en-US"/>
           </a:p>
@@ -332,10 +335,9 @@
           <a:lstStyle/>
           <a:p>
             <a:r>
-              <a:rPr lang="en-US" smtClean="0"/>
+              <a:rPr lang="en-US"/>
               <a:t>Click to edit Master title style</a:t>
             </a:r>
-            <a:endParaRPr lang="en-US"/>
           </a:p>
         </p:txBody>
       </p:sp>
@@ -356,38 +358,37 @@
           <a:p>
             <a:pPr lvl="0"/>
             <a:r>
-              <a:rPr lang="en-US" smtClean="0"/>
+              <a:rPr lang="en-US"/>
               <a:t>Click to edit Master text styles</a:t>
             </a:r>
           </a:p>
           <a:p>
             <a:pPr lvl="1"/>
             <a:r>
-              <a:rPr lang="en-US" smtClean="0"/>
+              <a:rPr lang="en-US"/>
               <a:t>Second level</a:t>
             </a:r>
           </a:p>
           <a:p>
             <a:pPr lvl="2"/>
             <a:r>
-              <a:rPr lang="en-US" smtClean="0"/>
+              <a:rPr lang="en-US"/>
               <a:t>Third level</a:t>
             </a:r>
           </a:p>
           <a:p>
             <a:pPr lvl="3"/>
             <a:r>
-              <a:rPr lang="en-US" smtClean="0"/>
+              <a:rPr lang="en-US"/>
               <a:t>Fourth level</a:t>
             </a:r>
           </a:p>
           <a:p>
             <a:pPr lvl="4"/>
             <a:r>
-              <a:rPr lang="en-US" smtClean="0"/>
+              <a:rPr lang="en-US"/>
               <a:t>Fifth level</a:t>
             </a:r>
-            <a:endParaRPr lang="en-US"/>
           </a:p>
         </p:txBody>
       </p:sp>
@@ -408,7 +409,7 @@
           <a:p>
             <a:fld id="{7FF674A5-C7DF-5E4D-B3C6-AAC72EBAE934}" type="datetimeFigureOut">
               <a:rPr lang="en-US" smtClean="0"/>
-              <a:t>4/27/17</a:t>
+              <a:t>4/30/18</a:t>
             </a:fld>
             <a:endParaRPr lang="en-US"/>
           </a:p>
@@ -507,10 +508,9 @@
           <a:lstStyle/>
           <a:p>
             <a:r>
-              <a:rPr lang="en-US" smtClean="0"/>
+              <a:rPr lang="en-US"/>
               <a:t>Click to edit Master title style</a:t>
             </a:r>
-            <a:endParaRPr lang="en-US"/>
           </a:p>
         </p:txBody>
       </p:sp>
@@ -536,38 +536,37 @@
           <a:p>
             <a:pPr lvl="0"/>
             <a:r>
-              <a:rPr lang="en-US" smtClean="0"/>
+              <a:rPr lang="en-US"/>
               <a:t>Click to edit Master text styles</a:t>
             </a:r>
           </a:p>
           <a:p>
             <a:pPr lvl="1"/>
             <a:r>
-              <a:rPr lang="en-US" smtClean="0"/>
+              <a:rPr lang="en-US"/>
               <a:t>Second level</a:t>
             </a:r>
           </a:p>
           <a:p>
             <a:pPr lvl="2"/>
             <a:r>
-              <a:rPr lang="en-US" smtClean="0"/>
+              <a:rPr lang="en-US"/>
               <a:t>Third level</a:t>
             </a:r>
           </a:p>
           <a:p>
             <a:pPr lvl="3"/>
             <a:r>
-              <a:rPr lang="en-US" smtClean="0"/>
+              <a:rPr lang="en-US"/>
               <a:t>Fourth level</a:t>
             </a:r>
           </a:p>
           <a:p>
             <a:pPr lvl="4"/>
             <a:r>
-              <a:rPr lang="en-US" smtClean="0"/>
+              <a:rPr lang="en-US"/>
               <a:t>Fifth level</a:t>
             </a:r>
-            <a:endParaRPr lang="en-US"/>
           </a:p>
         </p:txBody>
       </p:sp>
@@ -588,7 +587,7 @@
           <a:p>
             <a:fld id="{7FF674A5-C7DF-5E4D-B3C6-AAC72EBAE934}" type="datetimeFigureOut">
               <a:rPr lang="en-US" smtClean="0"/>
-              <a:t>4/27/17</a:t>
+              <a:t>4/30/18</a:t>
             </a:fld>
             <a:endParaRPr lang="en-US"/>
           </a:p>
@@ -682,10 +681,9 @@
           <a:lstStyle/>
           <a:p>
             <a:r>
-              <a:rPr lang="en-US" smtClean="0"/>
+              <a:rPr lang="en-US"/>
               <a:t>Click to edit Master title style</a:t>
             </a:r>
-            <a:endParaRPr lang="en-US"/>
           </a:p>
         </p:txBody>
       </p:sp>
@@ -706,38 +704,37 @@
           <a:p>
             <a:pPr lvl="0"/>
             <a:r>
-              <a:rPr lang="en-US" smtClean="0"/>
+              <a:rPr lang="en-US"/>
               <a:t>Click to edit Master text styles</a:t>
             </a:r>
           </a:p>
           <a:p>
             <a:pPr lvl="1"/>
             <a:r>
-              <a:rPr lang="en-US" smtClean="0"/>
+              <a:rPr lang="en-US"/>
               <a:t>Second level</a:t>
             </a:r>
           </a:p>
           <a:p>
             <a:pPr lvl="2"/>
             <a:r>
-              <a:rPr lang="en-US" smtClean="0"/>
+              <a:rPr lang="en-US"/>
               <a:t>Third level</a:t>
             </a:r>
           </a:p>
           <a:p>
             <a:pPr lvl="3"/>
             <a:r>
-              <a:rPr lang="en-US" smtClean="0"/>
+              <a:rPr lang="en-US"/>
               <a:t>Fourth level</a:t>
             </a:r>
           </a:p>
           <a:p>
             <a:pPr lvl="4"/>
             <a:r>
-              <a:rPr lang="en-US" smtClean="0"/>
+              <a:rPr lang="en-US"/>
               <a:t>Fifth level</a:t>
             </a:r>
-            <a:endParaRPr lang="en-US"/>
           </a:p>
         </p:txBody>
       </p:sp>
@@ -758,7 +755,7 @@
           <a:p>
             <a:fld id="{7FF674A5-C7DF-5E4D-B3C6-AAC72EBAE934}" type="datetimeFigureOut">
               <a:rPr lang="en-US" smtClean="0"/>
-              <a:t>4/27/17</a:t>
+              <a:t>4/30/18</a:t>
             </a:fld>
             <a:endParaRPr lang="en-US"/>
           </a:p>
@@ -861,10 +858,9 @@
           </a:lstStyle>
           <a:p>
             <a:r>
-              <a:rPr lang="en-US" smtClean="0"/>
+              <a:rPr lang="en-US"/>
               <a:t>Click to edit Master title style</a:t>
             </a:r>
-            <a:endParaRPr lang="en-US"/>
           </a:p>
         </p:txBody>
       </p:sp>
@@ -981,7 +977,7 @@
           <a:p>
             <a:pPr lvl="0"/>
             <a:r>
-              <a:rPr lang="en-US" smtClean="0"/>
+              <a:rPr lang="en-US"/>
               <a:t>Click to edit Master text styles</a:t>
             </a:r>
           </a:p>
@@ -1004,7 +1000,7 @@
           <a:p>
             <a:fld id="{7FF674A5-C7DF-5E4D-B3C6-AAC72EBAE934}" type="datetimeFigureOut">
               <a:rPr lang="en-US" smtClean="0"/>
-              <a:t>4/27/17</a:t>
+              <a:t>4/30/18</a:t>
             </a:fld>
             <a:endParaRPr lang="en-US"/>
           </a:p>
@@ -1098,10 +1094,9 @@
           <a:lstStyle/>
           <a:p>
             <a:r>
-              <a:rPr lang="en-US" smtClean="0"/>
+              <a:rPr lang="en-US"/>
               <a:t>Click to edit Master title style</a:t>
             </a:r>
-            <a:endParaRPr lang="en-US"/>
           </a:p>
         </p:txBody>
       </p:sp>
@@ -1127,38 +1122,37 @@
           <a:p>
             <a:pPr lvl="0"/>
             <a:r>
-              <a:rPr lang="en-US" smtClean="0"/>
+              <a:rPr lang="en-US"/>
               <a:t>Click to edit Master text styles</a:t>
             </a:r>
           </a:p>
           <a:p>
             <a:pPr lvl="1"/>
             <a:r>
-              <a:rPr lang="en-US" smtClean="0"/>
+              <a:rPr lang="en-US"/>
               <a:t>Second level</a:t>
             </a:r>
           </a:p>
           <a:p>
             <a:pPr lvl="2"/>
             <a:r>
-              <a:rPr lang="en-US" smtClean="0"/>
+              <a:rPr lang="en-US"/>
               <a:t>Third level</a:t>
             </a:r>
           </a:p>
           <a:p>
             <a:pPr lvl="3"/>
             <a:r>
-              <a:rPr lang="en-US" smtClean="0"/>
+              <a:rPr lang="en-US"/>
               <a:t>Fourth level</a:t>
             </a:r>
           </a:p>
           <a:p>
             <a:pPr lvl="4"/>
             <a:r>
-              <a:rPr lang="en-US" smtClean="0"/>
+              <a:rPr lang="en-US"/>
               <a:t>Fifth level</a:t>
             </a:r>
-            <a:endParaRPr lang="en-US"/>
           </a:p>
         </p:txBody>
       </p:sp>
@@ -1184,38 +1178,37 @@
           <a:p>
             <a:pPr lvl="0"/>
             <a:r>
-              <a:rPr lang="en-US" smtClean="0"/>
+              <a:rPr lang="en-US"/>
               <a:t>Click to edit Master text styles</a:t>
             </a:r>
           </a:p>
           <a:p>
             <a:pPr lvl="1"/>
             <a:r>
-              <a:rPr lang="en-US" smtClean="0"/>
+              <a:rPr lang="en-US"/>
               <a:t>Second level</a:t>
             </a:r>
           </a:p>
           <a:p>
             <a:pPr lvl="2"/>
             <a:r>
-              <a:rPr lang="en-US" smtClean="0"/>
+              <a:rPr lang="en-US"/>
               <a:t>Third level</a:t>
             </a:r>
           </a:p>
           <a:p>
             <a:pPr lvl="3"/>
             <a:r>
-              <a:rPr lang="en-US" smtClean="0"/>
+              <a:rPr lang="en-US"/>
               <a:t>Fourth level</a:t>
             </a:r>
           </a:p>
           <a:p>
             <a:pPr lvl="4"/>
             <a:r>
-              <a:rPr lang="en-US" smtClean="0"/>
+              <a:rPr lang="en-US"/>
               <a:t>Fifth level</a:t>
             </a:r>
-            <a:endParaRPr lang="en-US"/>
           </a:p>
         </p:txBody>
       </p:sp>
@@ -1236,7 +1229,7 @@
           <a:p>
             <a:fld id="{7FF674A5-C7DF-5E4D-B3C6-AAC72EBAE934}" type="datetimeFigureOut">
               <a:rPr lang="en-US" smtClean="0"/>
-              <a:t>4/27/17</a:t>
+              <a:t>4/30/18</a:t>
             </a:fld>
             <a:endParaRPr lang="en-US"/>
           </a:p>
@@ -1335,10 +1328,9 @@
           <a:lstStyle/>
           <a:p>
             <a:r>
-              <a:rPr lang="en-US" smtClean="0"/>
+              <a:rPr lang="en-US"/>
               <a:t>Click to edit Master title style</a:t>
             </a:r>
-            <a:endParaRPr lang="en-US"/>
           </a:p>
         </p:txBody>
       </p:sp>
@@ -1401,7 +1393,7 @@
           <a:p>
             <a:pPr lvl="0"/>
             <a:r>
-              <a:rPr lang="en-US" smtClean="0"/>
+              <a:rPr lang="en-US"/>
               <a:t>Click to edit Master text styles</a:t>
             </a:r>
           </a:p>
@@ -1429,38 +1421,37 @@
           <a:p>
             <a:pPr lvl="0"/>
             <a:r>
-              <a:rPr lang="en-US" smtClean="0"/>
+              <a:rPr lang="en-US"/>
               <a:t>Click to edit Master text styles</a:t>
             </a:r>
           </a:p>
           <a:p>
             <a:pPr lvl="1"/>
             <a:r>
-              <a:rPr lang="en-US" smtClean="0"/>
+              <a:rPr lang="en-US"/>
               <a:t>Second level</a:t>
             </a:r>
           </a:p>
           <a:p>
             <a:pPr lvl="2"/>
             <a:r>
-              <a:rPr lang="en-US" smtClean="0"/>
+              <a:rPr lang="en-US"/>
               <a:t>Third level</a:t>
             </a:r>
           </a:p>
           <a:p>
             <a:pPr lvl="3"/>
             <a:r>
-              <a:rPr lang="en-US" smtClean="0"/>
+              <a:rPr lang="en-US"/>
               <a:t>Fourth level</a:t>
             </a:r>
           </a:p>
           <a:p>
             <a:pPr lvl="4"/>
             <a:r>
-              <a:rPr lang="en-US" smtClean="0"/>
+              <a:rPr lang="en-US"/>
               <a:t>Fifth level</a:t>
             </a:r>
-            <a:endParaRPr lang="en-US"/>
           </a:p>
         </p:txBody>
       </p:sp>
@@ -1523,7 +1514,7 @@
           <a:p>
             <a:pPr lvl="0"/>
             <a:r>
-              <a:rPr lang="en-US" smtClean="0"/>
+              <a:rPr lang="en-US"/>
               <a:t>Click to edit Master text styles</a:t>
             </a:r>
           </a:p>
@@ -1551,38 +1542,37 @@
           <a:p>
             <a:pPr lvl="0"/>
             <a:r>
-              <a:rPr lang="en-US" smtClean="0"/>
+              <a:rPr lang="en-US"/>
               <a:t>Click to edit Master text styles</a:t>
             </a:r>
           </a:p>
           <a:p>
             <a:pPr lvl="1"/>
             <a:r>
-              <a:rPr lang="en-US" smtClean="0"/>
+              <a:rPr lang="en-US"/>
               <a:t>Second level</a:t>
             </a:r>
           </a:p>
           <a:p>
             <a:pPr lvl="2"/>
             <a:r>
-              <a:rPr lang="en-US" smtClean="0"/>
+              <a:rPr lang="en-US"/>
               <a:t>Third level</a:t>
             </a:r>
           </a:p>
           <a:p>
             <a:pPr lvl="3"/>
             <a:r>
-              <a:rPr lang="en-US" smtClean="0"/>
+              <a:rPr lang="en-US"/>
               <a:t>Fourth level</a:t>
             </a:r>
           </a:p>
           <a:p>
             <a:pPr lvl="4"/>
             <a:r>
-              <a:rPr lang="en-US" smtClean="0"/>
+              <a:rPr lang="en-US"/>
               <a:t>Fifth level</a:t>
             </a:r>
-            <a:endParaRPr lang="en-US"/>
           </a:p>
         </p:txBody>
       </p:sp>
@@ -1603,7 +1593,7 @@
           <a:p>
             <a:fld id="{7FF674A5-C7DF-5E4D-B3C6-AAC72EBAE934}" type="datetimeFigureOut">
               <a:rPr lang="en-US" smtClean="0"/>
-              <a:t>4/27/17</a:t>
+              <a:t>4/30/18</a:t>
             </a:fld>
             <a:endParaRPr lang="en-US"/>
           </a:p>
@@ -1697,10 +1687,9 @@
           <a:lstStyle/>
           <a:p>
             <a:r>
-              <a:rPr lang="en-US" smtClean="0"/>
+              <a:rPr lang="en-US"/>
               <a:t>Click to edit Master title style</a:t>
             </a:r>
-            <a:endParaRPr lang="en-US"/>
           </a:p>
         </p:txBody>
       </p:sp>
@@ -1721,7 +1710,7 @@
           <a:p>
             <a:fld id="{7FF674A5-C7DF-5E4D-B3C6-AAC72EBAE934}" type="datetimeFigureOut">
               <a:rPr lang="en-US" smtClean="0"/>
-              <a:t>4/27/17</a:t>
+              <a:t>4/30/18</a:t>
             </a:fld>
             <a:endParaRPr lang="en-US"/>
           </a:p>
@@ -1816,7 +1805,7 @@
           <a:p>
             <a:fld id="{7FF674A5-C7DF-5E4D-B3C6-AAC72EBAE934}" type="datetimeFigureOut">
               <a:rPr lang="en-US" smtClean="0"/>
-              <a:t>4/27/17</a:t>
+              <a:t>4/30/18</a:t>
             </a:fld>
             <a:endParaRPr lang="en-US"/>
           </a:p>
@@ -1919,10 +1908,9 @@
           </a:lstStyle>
           <a:p>
             <a:r>
-              <a:rPr lang="en-US" smtClean="0"/>
+              <a:rPr lang="en-US"/>
               <a:t>Click to edit Master title style</a:t>
             </a:r>
-            <a:endParaRPr lang="en-US"/>
           </a:p>
         </p:txBody>
       </p:sp>
@@ -1976,38 +1964,37 @@
           <a:p>
             <a:pPr lvl="0"/>
             <a:r>
-              <a:rPr lang="en-US" smtClean="0"/>
+              <a:rPr lang="en-US"/>
               <a:t>Click to edit Master text styles</a:t>
             </a:r>
           </a:p>
           <a:p>
             <a:pPr lvl="1"/>
             <a:r>
-              <a:rPr lang="en-US" smtClean="0"/>
+              <a:rPr lang="en-US"/>
               <a:t>Second level</a:t>
             </a:r>
           </a:p>
           <a:p>
             <a:pPr lvl="2"/>
             <a:r>
-              <a:rPr lang="en-US" smtClean="0"/>
+              <a:rPr lang="en-US"/>
               <a:t>Third level</a:t>
             </a:r>
           </a:p>
           <a:p>
             <a:pPr lvl="3"/>
             <a:r>
-              <a:rPr lang="en-US" smtClean="0"/>
+              <a:rPr lang="en-US"/>
               <a:t>Fourth level</a:t>
             </a:r>
           </a:p>
           <a:p>
             <a:pPr lvl="4"/>
             <a:r>
-              <a:rPr lang="en-US" smtClean="0"/>
+              <a:rPr lang="en-US"/>
               <a:t>Fifth level</a:t>
             </a:r>
-            <a:endParaRPr lang="en-US"/>
           </a:p>
         </p:txBody>
       </p:sp>
@@ -2070,7 +2057,7 @@
           <a:p>
             <a:pPr lvl="0"/>
             <a:r>
-              <a:rPr lang="en-US" smtClean="0"/>
+              <a:rPr lang="en-US"/>
               <a:t>Click to edit Master text styles</a:t>
             </a:r>
           </a:p>
@@ -2093,7 +2080,7 @@
           <a:p>
             <a:fld id="{7FF674A5-C7DF-5E4D-B3C6-AAC72EBAE934}" type="datetimeFigureOut">
               <a:rPr lang="en-US" smtClean="0"/>
-              <a:t>4/27/17</a:t>
+              <a:t>4/30/18</a:t>
             </a:fld>
             <a:endParaRPr lang="en-US"/>
           </a:p>
@@ -2196,10 +2183,9 @@
           </a:lstStyle>
           <a:p>
             <a:r>
-              <a:rPr lang="en-US" smtClean="0"/>
+              <a:rPr lang="en-US"/>
               <a:t>Click to edit Master title style</a:t>
             </a:r>
-            <a:endParaRPr lang="en-US"/>
           </a:p>
         </p:txBody>
       </p:sp>
@@ -2323,7 +2309,7 @@
           <a:p>
             <a:pPr lvl="0"/>
             <a:r>
-              <a:rPr lang="en-US" smtClean="0"/>
+              <a:rPr lang="en-US"/>
               <a:t>Click to edit Master text styles</a:t>
             </a:r>
           </a:p>
@@ -2346,7 +2332,7 @@
           <a:p>
             <a:fld id="{7FF674A5-C7DF-5E4D-B3C6-AAC72EBAE934}" type="datetimeFigureOut">
               <a:rPr lang="en-US" smtClean="0"/>
-              <a:t>4/27/17</a:t>
+              <a:t>4/30/18</a:t>
             </a:fld>
             <a:endParaRPr lang="en-US"/>
           </a:p>
@@ -2455,10 +2441,9 @@
           <a:lstStyle/>
           <a:p>
             <a:r>
-              <a:rPr lang="en-US" smtClean="0"/>
+              <a:rPr lang="en-US"/>
               <a:t>Click to edit Master title style</a:t>
             </a:r>
-            <a:endParaRPr lang="en-US"/>
           </a:p>
         </p:txBody>
       </p:sp>
@@ -2489,38 +2474,37 @@
           <a:p>
             <a:pPr lvl="0"/>
             <a:r>
-              <a:rPr lang="en-US" smtClean="0"/>
+              <a:rPr lang="en-US"/>
               <a:t>Click to edit Master text styles</a:t>
             </a:r>
           </a:p>
           <a:p>
             <a:pPr lvl="1"/>
             <a:r>
-              <a:rPr lang="en-US" smtClean="0"/>
+              <a:rPr lang="en-US"/>
               <a:t>Second level</a:t>
             </a:r>
           </a:p>
           <a:p>
             <a:pPr lvl="2"/>
             <a:r>
-              <a:rPr lang="en-US" smtClean="0"/>
+              <a:rPr lang="en-US"/>
               <a:t>Third level</a:t>
             </a:r>
           </a:p>
           <a:p>
             <a:pPr lvl="3"/>
             <a:r>
-              <a:rPr lang="en-US" smtClean="0"/>
+              <a:rPr lang="en-US"/>
               <a:t>Fourth level</a:t>
             </a:r>
           </a:p>
           <a:p>
             <a:pPr lvl="4"/>
             <a:r>
-              <a:rPr lang="en-US" smtClean="0"/>
+              <a:rPr lang="en-US"/>
               <a:t>Fifth level</a:t>
             </a:r>
-            <a:endParaRPr lang="en-US"/>
           </a:p>
         </p:txBody>
       </p:sp>
@@ -2559,7 +2543,7 @@
           <a:p>
             <a:fld id="{7FF674A5-C7DF-5E4D-B3C6-AAC72EBAE934}" type="datetimeFigureOut">
               <a:rPr lang="en-US" smtClean="0"/>
-              <a:t>4/27/17</a:t>
+              <a:t>4/30/18</a:t>
             </a:fld>
             <a:endParaRPr lang="en-US"/>
           </a:p>
@@ -3268,10 +3252,9 @@
             <a:lstStyle/>
             <a:p>
               <a:r>
-                <a:rPr lang="en-US" i="1" dirty="0" smtClean="0"/>
+                <a:rPr lang="en-US" i="1" dirty="0"/>
                 <a:t>j</a:t>
               </a:r>
-              <a:endParaRPr lang="en-US" i="1" dirty="0"/>
             </a:p>
           </p:txBody>
         </p:sp>
@@ -3284,7 +3267,7 @@
           <p:spPr>
             <a:xfrm>
               <a:off x="5289556" y="2327936"/>
-              <a:ext cx="130959" cy="369332"/>
+              <a:ext cx="169849" cy="369332"/>
             </a:xfrm>
             <a:prstGeom prst="rect">
               <a:avLst/>
@@ -3298,10 +3281,9 @@
             <a:lstStyle/>
             <a:p>
               <a:r>
-                <a:rPr lang="en-US" smtClean="0"/>
-                <a:t>1</a:t>
+                <a:rPr lang="en-US" dirty="0"/>
+                <a:t>7</a:t>
               </a:r>
-              <a:endParaRPr lang="en-US" dirty="0"/>
             </a:p>
           </p:txBody>
         </p:sp>
@@ -3328,10 +3310,9 @@
             <a:lstStyle/>
             <a:p>
               <a:r>
-                <a:rPr lang="en-US" dirty="0" smtClean="0"/>
-                <a:t>3</a:t>
+                <a:rPr lang="en-US" dirty="0"/>
+                <a:t>5</a:t>
               </a:r>
-              <a:endParaRPr lang="en-US" dirty="0"/>
             </a:p>
           </p:txBody>
         </p:sp>
@@ -3358,10 +3339,9 @@
             <a:lstStyle/>
             <a:p>
               <a:r>
-                <a:rPr lang="en-US" dirty="0" smtClean="0"/>
-                <a:t>2</a:t>
+                <a:rPr lang="en-US" dirty="0"/>
+                <a:t>6</a:t>
               </a:r>
-              <a:endParaRPr lang="en-US" dirty="0"/>
             </a:p>
           </p:txBody>
         </p:sp>
@@ -3388,10 +3368,9 @@
             <a:lstStyle/>
             <a:p>
               <a:r>
-                <a:rPr lang="en-US" dirty="0" smtClean="0"/>
+                <a:rPr lang="en-US" dirty="0"/>
                 <a:t>4</a:t>
               </a:r>
-              <a:endParaRPr lang="en-US" dirty="0"/>
             </a:p>
           </p:txBody>
         </p:sp>
@@ -3418,10 +3397,9 @@
             <a:lstStyle/>
             <a:p>
               <a:r>
-                <a:rPr lang="en-US" dirty="0" smtClean="0"/>
-                <a:t>5</a:t>
+                <a:rPr lang="en-US" dirty="0"/>
+                <a:t>3</a:t>
               </a:r>
-              <a:endParaRPr lang="en-US" dirty="0"/>
             </a:p>
           </p:txBody>
         </p:sp>
@@ -3448,10 +3426,9 @@
             <a:lstStyle/>
             <a:p>
               <a:r>
-                <a:rPr lang="en-US"/>
-                <a:t>6</a:t>
+                <a:rPr lang="en-US" dirty="0"/>
+                <a:t>2</a:t>
               </a:r>
-              <a:endParaRPr lang="en-US" dirty="0"/>
             </a:p>
           </p:txBody>
         </p:sp>
@@ -3797,10 +3774,9 @@
             <a:lstStyle/>
             <a:p>
               <a:r>
-                <a:rPr lang="en-US" dirty="0" smtClean="0"/>
-                <a:t>7</a:t>
+                <a:rPr lang="en-US" dirty="0"/>
+                <a:t>1</a:t>
               </a:r>
-              <a:endParaRPr lang="en-US" dirty="0"/>
             </a:p>
           </p:txBody>
         </p:sp>
@@ -3831,10 +3807,9 @@
                 <a:t>n</a:t>
               </a:r>
               <a:r>
-                <a:rPr lang="en-US" dirty="0" smtClean="0"/>
+                <a:rPr lang="en-US" dirty="0"/>
                 <a:t>=0</a:t>
               </a:r>
-              <a:endParaRPr lang="en-US" dirty="0"/>
             </a:p>
           </p:txBody>
         </p:sp>

</xml_diff>